<commit_message>
update poster and graph
</commit_message>
<xml_diff>
--- a/SupprtFiles/poster042togethertogether.pptx
+++ b/SupprtFiles/poster042togethertogether.pptx
@@ -3706,10 +3706,10 @@
       </p:pic>
       <p:pic>
         <p:nvPicPr>
-          <p:cNvPr id="1026" name="Picture 2" descr="https://lh4.googleusercontent.com/yVSH34hditS8zVUkWQmh0RkA5PlL3xnilPumkotBLTXUbCVGbq-fjZoGt7Dk4sMZapN1nvBm4ZpI0Ytj-kkVXozuDmqvMQOr-E5vpqCdKQJJOcciaXiZ__93KyABfq142BDZHUEk3rA">
+          <p:cNvPr id="1028" name="Picture 4" descr="https://lh3.googleusercontent.com/7FJi-Dj9AdZK-SYUFUU3xoeJZtj5T8aB9NfxHmls24nAC4J6C5ovc-QXEYWpDxo85TWrAywwGpUFrEPSWiHvyRVaouqnO8yFD3K6Mjk9gqrvqIKnioaN-z4KNXJ9yHw5FH2v0iNfQvs">
             <a:extLst>
               <a:ext uri="{FF2B5EF4-FFF2-40B4-BE49-F238E27FC236}">
-                <a16:creationId xmlns:a16="http://schemas.microsoft.com/office/drawing/2014/main" id="{92FFC33D-4FE3-FE4D-85A8-80BB5B498E18}"/>
+                <a16:creationId xmlns:a16="http://schemas.microsoft.com/office/drawing/2014/main" id="{99614716-DEEA-6D43-9515-4FBB1C8264A9}"/>
               </a:ext>
             </a:extLst>
           </p:cNvPr>
@@ -3733,8 +3733,8 @@
         </p:blipFill>
         <p:spPr bwMode="auto">
           <a:xfrm>
-            <a:off x="8324268" y="17676655"/>
-            <a:ext cx="9715500" cy="7286625"/>
+            <a:off x="7740394" y="4065627"/>
+            <a:ext cx="9557006" cy="7167754"/>
           </a:xfrm>
           <a:prstGeom prst="rect">
             <a:avLst/>
@@ -3762,62 +3762,6 @@
       </p:pic>
       <p:pic>
         <p:nvPicPr>
-          <p:cNvPr id="1028" name="Picture 4" descr="https://lh3.googleusercontent.com/7FJi-Dj9AdZK-SYUFUU3xoeJZtj5T8aB9NfxHmls24nAC4J6C5ovc-QXEYWpDxo85TWrAywwGpUFrEPSWiHvyRVaouqnO8yFD3K6Mjk9gqrvqIKnioaN-z4KNXJ9yHw5FH2v0iNfQvs">
-            <a:extLst>
-              <a:ext uri="{FF2B5EF4-FFF2-40B4-BE49-F238E27FC236}">
-                <a16:creationId xmlns:a16="http://schemas.microsoft.com/office/drawing/2014/main" id="{99614716-DEEA-6D43-9515-4FBB1C8264A9}"/>
-              </a:ext>
-            </a:extLst>
-          </p:cNvPr>
-          <p:cNvPicPr>
-            <a:picLocks noChangeAspect="1" noChangeArrowheads="1"/>
-          </p:cNvPicPr>
-          <p:nvPr/>
-        </p:nvPicPr>
-        <p:blipFill>
-          <a:blip r:embed="rId5">
-            <a:extLst>
-              <a:ext uri="{28A0092B-C50C-407E-A947-70E740481C1C}">
-                <a14:useLocalDpi xmlns:a14="http://schemas.microsoft.com/office/drawing/2010/main" val="0"/>
-              </a:ext>
-            </a:extLst>
-          </a:blip>
-          <a:srcRect/>
-          <a:stretch>
-            <a:fillRect/>
-          </a:stretch>
-        </p:blipFill>
-        <p:spPr bwMode="auto">
-          <a:xfrm>
-            <a:off x="7740394" y="4065627"/>
-            <a:ext cx="9557006" cy="7167754"/>
-          </a:xfrm>
-          <a:prstGeom prst="rect">
-            <a:avLst/>
-          </a:prstGeom>
-          <a:ln>
-            <a:noFill/>
-          </a:ln>
-          <a:effectLst>
-            <a:outerShdw blurRad="292100" dist="139700" dir="2700000" algn="tl" rotWithShape="0">
-              <a:srgbClr val="333333">
-                <a:alpha val="65000"/>
-              </a:srgbClr>
-            </a:outerShdw>
-          </a:effectLst>
-          <a:extLst>
-            <a:ext uri="{909E8E84-426E-40DD-AFC4-6F175D3DCCD1}">
-              <a14:hiddenFill xmlns:a14="http://schemas.microsoft.com/office/drawing/2010/main">
-                <a:solidFill>
-                  <a:srgbClr val="FFFFFF"/>
-                </a:solidFill>
-              </a14:hiddenFill>
-            </a:ext>
-          </a:extLst>
-        </p:spPr>
-      </p:pic>
-      <p:pic>
-        <p:nvPicPr>
           <p:cNvPr id="4" name="Picture 3">
             <a:extLst>
               <a:ext uri="{FF2B5EF4-FFF2-40B4-BE49-F238E27FC236}">
@@ -3831,7 +3775,7 @@
           <p:nvPr/>
         </p:nvPicPr>
         <p:blipFill rotWithShape="1">
-          <a:blip r:embed="rId6"/>
+          <a:blip r:embed="rId5"/>
           <a:srcRect l="9678" t="4362" r="15548" b="6167"/>
           <a:stretch/>
         </p:blipFill>
@@ -3874,104 +3818,14 @@
           <p:nvPr/>
         </p:nvPicPr>
         <p:blipFill rotWithShape="1">
-          <a:blip r:embed="rId7"/>
+          <a:blip r:embed="rId6"/>
           <a:srcRect t="39447" b="34291"/>
           <a:stretch/>
         </p:blipFill>
         <p:spPr>
           <a:xfrm>
-            <a:off x="8324268" y="11975142"/>
+            <a:off x="8324268" y="12813342"/>
             <a:ext cx="12706932" cy="2807658"/>
-          </a:xfrm>
-          <a:prstGeom prst="rect">
-            <a:avLst/>
-          </a:prstGeom>
-        </p:spPr>
-      </p:pic>
-      <p:pic>
-        <p:nvPicPr>
-          <p:cNvPr id="6" name="Picture 5">
-            <a:extLst>
-              <a:ext uri="{FF2B5EF4-FFF2-40B4-BE49-F238E27FC236}">
-                <a16:creationId xmlns:a16="http://schemas.microsoft.com/office/drawing/2014/main" id="{138BD035-A1CF-9C43-B54F-A92A575C4AB8}"/>
-              </a:ext>
-            </a:extLst>
-          </p:cNvPr>
-          <p:cNvPicPr>
-            <a:picLocks noChangeAspect="1"/>
-          </p:cNvPicPr>
-          <p:nvPr/>
-        </p:nvPicPr>
-        <p:blipFill>
-          <a:blip r:embed="rId8"/>
-          <a:stretch>
-            <a:fillRect/>
-          </a:stretch>
-        </p:blipFill>
-        <p:spPr>
-          <a:xfrm>
-            <a:off x="1044214" y="18347160"/>
-            <a:ext cx="5980177" cy="3986784"/>
-          </a:xfrm>
-          <a:prstGeom prst="rect">
-            <a:avLst/>
-          </a:prstGeom>
-        </p:spPr>
-      </p:pic>
-      <p:pic>
-        <p:nvPicPr>
-          <p:cNvPr id="8" name="Picture 7">
-            <a:extLst>
-              <a:ext uri="{FF2B5EF4-FFF2-40B4-BE49-F238E27FC236}">
-                <a16:creationId xmlns:a16="http://schemas.microsoft.com/office/drawing/2014/main" id="{38E9E1E1-8AF2-E04E-B57B-DF7C519A364A}"/>
-              </a:ext>
-            </a:extLst>
-          </p:cNvPr>
-          <p:cNvPicPr>
-            <a:picLocks noChangeAspect="1"/>
-          </p:cNvPicPr>
-          <p:nvPr/>
-        </p:nvPicPr>
-        <p:blipFill>
-          <a:blip r:embed="rId9"/>
-          <a:stretch>
-            <a:fillRect/>
-          </a:stretch>
-        </p:blipFill>
-        <p:spPr>
-          <a:xfrm>
-            <a:off x="1044214" y="23289773"/>
-            <a:ext cx="5980177" cy="3986784"/>
-          </a:xfrm>
-          <a:prstGeom prst="rect">
-            <a:avLst/>
-          </a:prstGeom>
-        </p:spPr>
-      </p:pic>
-      <p:pic>
-        <p:nvPicPr>
-          <p:cNvPr id="16" name="Picture 15">
-            <a:extLst>
-              <a:ext uri="{FF2B5EF4-FFF2-40B4-BE49-F238E27FC236}">
-                <a16:creationId xmlns:a16="http://schemas.microsoft.com/office/drawing/2014/main" id="{6782F7E0-4F19-D34B-BE08-1AFB07D4BEAF}"/>
-              </a:ext>
-            </a:extLst>
-          </p:cNvPr>
-          <p:cNvPicPr>
-            <a:picLocks noChangeAspect="1"/>
-          </p:cNvPicPr>
-          <p:nvPr/>
-        </p:nvPicPr>
-        <p:blipFill>
-          <a:blip r:embed="rId10"/>
-          <a:stretch>
-            <a:fillRect/>
-          </a:stretch>
-        </p:blipFill>
-        <p:spPr>
-          <a:xfrm>
-            <a:off x="1044214" y="13296331"/>
-            <a:ext cx="5980177" cy="3986784"/>
           </a:xfrm>
           <a:prstGeom prst="rect">
             <a:avLst/>
@@ -3992,8 +3846,8 @@
         </p:nvSpPr>
         <p:spPr>
           <a:xfrm>
-            <a:off x="17297401" y="4712899"/>
-            <a:ext cx="3816904" cy="5632311"/>
+            <a:off x="17297400" y="4712899"/>
+            <a:ext cx="3816905" cy="8309967"/>
           </a:xfrm>
           <a:prstGeom prst="rect">
             <a:avLst/>
@@ -4015,11 +3869,11 @@
               <a:t> </a:t>
             </a:r>
             <a:r>
-              <a:rPr lang="en-US" b="1" dirty="0"/>
+              <a:rPr lang="en-US" sz="3000" b="1" dirty="0"/>
               <a:t>Virtual Time Manager</a:t>
             </a:r>
             <a:r>
-              <a:rPr lang="en-US" dirty="0"/>
+              <a:rPr lang="en-US" sz="3000" dirty="0"/>
               <a:t> contains two subprocesses: </a:t>
             </a:r>
           </a:p>
@@ -4031,31 +3885,31 @@
               <a:buAutoNum type="arabicPeriod"/>
             </a:pPr>
             <a:r>
-              <a:rPr lang="en-US" dirty="0"/>
-              <a:t>The host activity is green part of the diagram.</a:t>
-            </a:r>
-            <a:r>
-              <a:rPr lang="zh-Hant" altLang="en-US" dirty="0"/>
+              <a:rPr lang="en-US" sz="2800" dirty="0"/>
+              <a:t>The green part of the diagram represents the host activity.</a:t>
+            </a:r>
+            <a:r>
+              <a:rPr lang="zh-Hant" altLang="en-US" sz="2800" dirty="0"/>
               <a:t> </a:t>
             </a:r>
             <a:r>
-              <a:rPr lang="en-US" altLang="zh-Hant" dirty="0"/>
-              <a:t>The host can be either Controller, switch or sensor.</a:t>
+              <a:rPr lang="en-US" altLang="zh-Hant" sz="2800" dirty="0"/>
+              <a:t>The host can be either a Controller, a Switch or a Sensor.</a:t>
             </a:r>
           </a:p>
           <a:p>
             <a:pPr marL="457200" indent="-457200">
               <a:buAutoNum type="arabicPeriod"/>
             </a:pPr>
-            <a:endParaRPr lang="en-US" dirty="0"/>
+            <a:endParaRPr lang="en-US" sz="2800" dirty="0"/>
           </a:p>
           <a:p>
             <a:pPr marL="457200" indent="-457200">
               <a:buAutoNum type="arabicPeriod"/>
             </a:pPr>
             <a:r>
-              <a:rPr lang="en-US" dirty="0"/>
-              <a:t>The network Coordinator (NC) is red part of the diagram which handles all pausing, resuming and other network communications.</a:t>
+              <a:rPr lang="en-US" sz="2800" dirty="0"/>
+              <a:t>The red part of the diagram represents the Network Coordinator (NC) which handles all pausing, resuming and other network communications.</a:t>
             </a:r>
           </a:p>
         </p:txBody>
@@ -4074,8 +3928,8 @@
         </p:nvSpPr>
         <p:spPr>
           <a:xfrm>
-            <a:off x="8534400" y="15018603"/>
-            <a:ext cx="12360222" cy="830997"/>
+            <a:off x="8534400" y="15367337"/>
+            <a:ext cx="12360222" cy="1015663"/>
           </a:xfrm>
           <a:prstGeom prst="rect">
             <a:avLst/>
@@ -4089,7 +3943,7 @@
           <a:lstStyle/>
           <a:p>
             <a:r>
-              <a:rPr lang="en-US" dirty="0"/>
+              <a:rPr lang="en-US" sz="3000" dirty="0"/>
               <a:t>↑ The flow diagram represents the overview of distributed algorithm within the kernel module, VTGPIO, layer.</a:t>
             </a:r>
           </a:p>
@@ -4110,7 +3964,7 @@
         <p:spPr>
           <a:xfrm>
             <a:off x="16517806" y="25183938"/>
-            <a:ext cx="4376815" cy="6740307"/>
+            <a:ext cx="4513394" cy="6740307"/>
           </a:xfrm>
           <a:prstGeom prst="rect">
             <a:avLst/>
@@ -4124,51 +3978,56 @@
           <a:lstStyle/>
           <a:p>
             <a:r>
-              <a:rPr lang="zh-Hant" altLang="en-US" dirty="0"/>
+              <a:rPr lang="zh-Hant" altLang="en-US" sz="2800" dirty="0"/>
               <a:t>⟵</a:t>
             </a:r>
             <a:r>
-              <a:rPr lang="en-US" altLang="zh-Hant" dirty="0"/>
+              <a:rPr lang="en-US" altLang="zh-Hant" sz="2800" dirty="0"/>
               <a:t> Architecture of distributed system composed of 3 communication channels: Ethernet, wireless management, and direct hardware connection with general purpose and router Linux hardware.</a:t>
             </a:r>
-          </a:p>
-          <a:p>
-            <a:endParaRPr lang="en-US" dirty="0"/>
-          </a:p>
-          <a:p>
-            <a:r>
-              <a:rPr lang="en-US" dirty="0"/>
-              <a:t>The top node             </a:t>
-            </a:r>
-          </a:p>
-          <a:p>
-            <a:r>
-              <a:rPr lang="en-US" dirty="0"/>
+            <a:endParaRPr lang="en-US" sz="2800" dirty="0"/>
+          </a:p>
+          <a:p>
+            <a:r>
+              <a:rPr lang="en-US" sz="2600" i="1" dirty="0"/>
+              <a:t>The top node</a:t>
+            </a:r>
+            <a:r>
+              <a:rPr lang="en-US" sz="2600" dirty="0"/>
+              <a:t>             </a:t>
+            </a:r>
+          </a:p>
+          <a:p>
+            <a:r>
+              <a:rPr lang="en-US" sz="2600" dirty="0"/>
               <a:t>Monitoring machine which is not in Virtual Time.</a:t>
             </a:r>
-          </a:p>
-          <a:p>
             <a:br>
-              <a:rPr lang="en-US" dirty="0"/>
+              <a:rPr lang="en-US" sz="2600" i="1" dirty="0"/>
             </a:br>
             <a:r>
-              <a:rPr lang="en-US" dirty="0"/>
+              <a:rPr lang="en-US" sz="2600" i="1" dirty="0"/>
               <a:t>The bottom nodes</a:t>
             </a:r>
           </a:p>
           <a:p>
             <a:r>
-              <a:rPr lang="en-US" dirty="0"/>
+              <a:rPr lang="en-US" sz="2600" dirty="0"/>
               <a:t>Embedded Linux devices</a:t>
             </a:r>
           </a:p>
           <a:p>
-            <a:endParaRPr lang="en-US" dirty="0"/>
-          </a:p>
-          <a:p>
-            <a:r>
-              <a:rPr lang="en-US" dirty="0"/>
-              <a:t>          wireless and  wired indicate the connection between switches, router and nodes</a:t>
+            <a:r>
+              <a:rPr lang="en-US" sz="2600" dirty="0"/>
+              <a:t>          </a:t>
+            </a:r>
+            <a:r>
+              <a:rPr lang="en-US" sz="2600" i="1" dirty="0"/>
+              <a:t>wireless and  wired </a:t>
+            </a:r>
+            <a:r>
+              <a:rPr lang="en-US" sz="2600" dirty="0"/>
+              <a:t>indicate the connection between switches, router and nodes</a:t>
             </a:r>
           </a:p>
         </p:txBody>
@@ -4188,7 +4047,7 @@
           <p:nvPr/>
         </p:nvPicPr>
         <p:blipFill>
-          <a:blip r:embed="rId11">
+          <a:blip r:embed="rId7">
             <a:extLst>
               <a:ext uri="{28A0092B-C50C-407E-A947-70E740481C1C}">
                 <a14:useLocalDpi xmlns:a14="http://schemas.microsoft.com/office/drawing/2010/main" val="0"/>
@@ -4202,8 +4061,8 @@
         </p:blipFill>
         <p:spPr bwMode="auto">
           <a:xfrm>
-            <a:off x="18039768" y="27844610"/>
-            <a:ext cx="752351" cy="752351"/>
+            <a:off x="18378672" y="28586944"/>
+            <a:ext cx="595128" cy="595128"/>
           </a:xfrm>
           <a:prstGeom prst="rect">
             <a:avLst/>
@@ -4235,7 +4094,7 @@
           <p:nvPr/>
         </p:nvPicPr>
         <p:blipFill>
-          <a:blip r:embed="rId11">
+          <a:blip r:embed="rId7">
             <a:extLst>
               <a:ext uri="{28A0092B-C50C-407E-A947-70E740481C1C}">
                 <a14:useLocalDpi xmlns:a14="http://schemas.microsoft.com/office/drawing/2010/main" val="0"/>
@@ -4249,8 +4108,8 @@
         </p:blipFill>
         <p:spPr bwMode="auto">
           <a:xfrm>
-            <a:off x="18612099" y="29363152"/>
-            <a:ext cx="752351" cy="752351"/>
+            <a:off x="19003154" y="29794200"/>
+            <a:ext cx="580246" cy="580246"/>
           </a:xfrm>
           <a:prstGeom prst="rect">
             <a:avLst/>
@@ -4282,7 +4141,7 @@
           <p:nvPr/>
         </p:nvPicPr>
         <p:blipFill>
-          <a:blip r:embed="rId12">
+          <a:blip r:embed="rId8">
             <a:extLst>
               <a:ext uri="{28A0092B-C50C-407E-A947-70E740481C1C}">
                 <a14:useLocalDpi xmlns:a14="http://schemas.microsoft.com/office/drawing/2010/main" val="0"/>
@@ -4296,8 +4155,8 @@
         </p:blipFill>
         <p:spPr bwMode="auto">
           <a:xfrm>
-            <a:off x="16691545" y="30644575"/>
-            <a:ext cx="585094" cy="510202"/>
+            <a:off x="16840200" y="30720775"/>
+            <a:ext cx="335579" cy="292625"/>
           </a:xfrm>
           <a:prstGeom prst="rect">
             <a:avLst/>
@@ -4328,8 +4187,8 @@
         </p:nvSpPr>
         <p:spPr>
           <a:xfrm>
-            <a:off x="17983200" y="19337953"/>
-            <a:ext cx="2971800" cy="4893647"/>
+            <a:off x="17983199" y="18056959"/>
+            <a:ext cx="3131105" cy="6555641"/>
           </a:xfrm>
           <a:prstGeom prst="rect">
             <a:avLst/>
@@ -4343,39 +4202,301 @@
           <a:lstStyle/>
           <a:p>
             <a:r>
+              <a:rPr lang="zh-Hant" altLang="en-US" sz="2800" dirty="0"/>
+              <a:t>⟵</a:t>
+            </a:r>
+            <a:r>
+              <a:rPr lang="en-US" altLang="zh-Hant" sz="2800" dirty="0"/>
+              <a:t> The relationship between distributed systems.</a:t>
+            </a:r>
+          </a:p>
+          <a:p>
+            <a:endParaRPr lang="en-US" sz="2800" dirty="0"/>
+          </a:p>
+          <a:p>
+            <a:r>
+              <a:rPr lang="en-US" sz="2800" dirty="0"/>
+              <a:t>Each node has 2 major layers: Virtual Time Manager and Virtual Time kernel.</a:t>
+            </a:r>
+          </a:p>
+          <a:p>
+            <a:endParaRPr lang="en-US" sz="2800" dirty="0"/>
+          </a:p>
+          <a:p>
+            <a:r>
+              <a:rPr lang="en-US" sz="2800" dirty="0"/>
+              <a:t>They are all connected using </a:t>
+            </a:r>
+            <a:r>
+              <a:rPr lang="en-US" altLang="zh-Hant" sz="2800" dirty="0"/>
+              <a:t>Ethernet, wireless networking, and direct hardware connection.</a:t>
+            </a:r>
+            <a:endParaRPr lang="en-US" sz="2800" dirty="0"/>
+          </a:p>
+        </p:txBody>
+      </p:sp>
+      <p:pic>
+        <p:nvPicPr>
+          <p:cNvPr id="5" name="Picture 4">
+            <a:extLst>
+              <a:ext uri="{FF2B5EF4-FFF2-40B4-BE49-F238E27FC236}">
+                <a16:creationId xmlns:a16="http://schemas.microsoft.com/office/drawing/2014/main" id="{DFC3BD53-52D8-0E40-A281-900A84C12F9B}"/>
+              </a:ext>
+            </a:extLst>
+          </p:cNvPr>
+          <p:cNvPicPr>
+            <a:picLocks noChangeAspect="1"/>
+          </p:cNvPicPr>
+          <p:nvPr/>
+        </p:nvPicPr>
+        <p:blipFill rotWithShape="1">
+          <a:blip r:embed="rId9"/>
+          <a:srcRect l="2754" t="8807" b="2372"/>
+          <a:stretch/>
+        </p:blipFill>
+        <p:spPr>
+          <a:xfrm>
+            <a:off x="8229600" y="18233211"/>
+            <a:ext cx="9868834" cy="6760389"/>
+          </a:xfrm>
+          <a:prstGeom prst="rect">
+            <a:avLst/>
+          </a:prstGeom>
+        </p:spPr>
+      </p:pic>
+      <p:pic>
+        <p:nvPicPr>
+          <p:cNvPr id="11" name="Picture 10">
+            <a:extLst>
+              <a:ext uri="{FF2B5EF4-FFF2-40B4-BE49-F238E27FC236}">
+                <a16:creationId xmlns:a16="http://schemas.microsoft.com/office/drawing/2014/main" id="{750EACC3-9E64-BB48-8F3F-916AFAF03AEC}"/>
+              </a:ext>
+            </a:extLst>
+          </p:cNvPr>
+          <p:cNvPicPr>
+            <a:picLocks noChangeAspect="1"/>
+          </p:cNvPicPr>
+          <p:nvPr/>
+        </p:nvPicPr>
+        <p:blipFill>
+          <a:blip r:embed="rId10"/>
+          <a:stretch>
+            <a:fillRect/>
+          </a:stretch>
+        </p:blipFill>
+        <p:spPr>
+          <a:xfrm>
+            <a:off x="1488752" y="19938878"/>
+            <a:ext cx="5067483" cy="3378322"/>
+          </a:xfrm>
+          <a:prstGeom prst="rect">
+            <a:avLst/>
+          </a:prstGeom>
+        </p:spPr>
+      </p:pic>
+      <p:pic>
+        <p:nvPicPr>
+          <p:cNvPr id="13" name="Picture 12">
+            <a:extLst>
+              <a:ext uri="{FF2B5EF4-FFF2-40B4-BE49-F238E27FC236}">
+                <a16:creationId xmlns:a16="http://schemas.microsoft.com/office/drawing/2014/main" id="{1E2735D5-D8F7-4548-A95A-D0BB430995AD}"/>
+              </a:ext>
+            </a:extLst>
+          </p:cNvPr>
+          <p:cNvPicPr>
+            <a:picLocks noChangeAspect="1"/>
+          </p:cNvPicPr>
+          <p:nvPr/>
+        </p:nvPicPr>
+        <p:blipFill>
+          <a:blip r:embed="rId11"/>
+          <a:stretch>
+            <a:fillRect/>
+          </a:stretch>
+        </p:blipFill>
+        <p:spPr>
+          <a:xfrm>
+            <a:off x="1406274" y="12962943"/>
+            <a:ext cx="5184659" cy="3456439"/>
+          </a:xfrm>
+          <a:prstGeom prst="rect">
+            <a:avLst/>
+          </a:prstGeom>
+        </p:spPr>
+      </p:pic>
+      <p:pic>
+        <p:nvPicPr>
+          <p:cNvPr id="20" name="Picture 19">
+            <a:extLst>
+              <a:ext uri="{FF2B5EF4-FFF2-40B4-BE49-F238E27FC236}">
+                <a16:creationId xmlns:a16="http://schemas.microsoft.com/office/drawing/2014/main" id="{AA04B7BF-FEF1-3542-881B-8ED3A9C1FD1C}"/>
+              </a:ext>
+            </a:extLst>
+          </p:cNvPr>
+          <p:cNvPicPr>
+            <a:picLocks noChangeAspect="1"/>
+          </p:cNvPicPr>
+          <p:nvPr/>
+        </p:nvPicPr>
+        <p:blipFill>
+          <a:blip r:embed="rId12"/>
+          <a:stretch>
+            <a:fillRect/>
+          </a:stretch>
+        </p:blipFill>
+        <p:spPr>
+          <a:xfrm>
+            <a:off x="877956" y="25527000"/>
+            <a:ext cx="4086537" cy="2314814"/>
+          </a:xfrm>
+          <a:prstGeom prst="rect">
+            <a:avLst/>
+          </a:prstGeom>
+          <a:ln>
+            <a:noFill/>
+          </a:ln>
+          <a:effectLst>
+            <a:outerShdw blurRad="292100" dist="139700" dir="2700000" algn="tl" rotWithShape="0">
+              <a:srgbClr val="333333">
+                <a:alpha val="65000"/>
+              </a:srgbClr>
+            </a:outerShdw>
+          </a:effectLst>
+        </p:spPr>
+      </p:pic>
+      <p:sp>
+        <p:nvSpPr>
+          <p:cNvPr id="23" name="TextBox 22">
+            <a:extLst>
+              <a:ext uri="{FF2B5EF4-FFF2-40B4-BE49-F238E27FC236}">
+                <a16:creationId xmlns:a16="http://schemas.microsoft.com/office/drawing/2014/main" id="{7082A509-636C-D44A-8018-8F14732F7F9E}"/>
+              </a:ext>
+            </a:extLst>
+          </p:cNvPr>
+          <p:cNvSpPr txBox="1"/>
+          <p:nvPr/>
+        </p:nvSpPr>
+        <p:spPr>
+          <a:xfrm>
+            <a:off x="762000" y="23545800"/>
+            <a:ext cx="6531388" cy="1569660"/>
+          </a:xfrm>
+          <a:prstGeom prst="rect">
+            <a:avLst/>
+          </a:prstGeom>
+          <a:noFill/>
+        </p:spPr>
+        <p:txBody>
+          <a:bodyPr wrap="square" rtlCol="0">
+            <a:spAutoFit/>
+          </a:bodyPr>
+          <a:lstStyle/>
+          <a:p>
+            <a:pPr algn="just"/>
+            <a:r>
+              <a:rPr lang="en-US" dirty="0"/>
+              <a:t>↑ Host to NC: The overhead between Host and  Network Coordinator </a:t>
+            </a:r>
+          </a:p>
+          <a:p>
+            <a:pPr algn="just"/>
+            <a:r>
+              <a:rPr lang="en-US" dirty="0"/>
+              <a:t>NC to VTGPIO: The overhead between Network Coordinator and  Kernel Module.</a:t>
+            </a:r>
+          </a:p>
+        </p:txBody>
+      </p:sp>
+      <p:sp>
+        <p:nvSpPr>
+          <p:cNvPr id="24" name="TextBox 23">
+            <a:extLst>
+              <a:ext uri="{FF2B5EF4-FFF2-40B4-BE49-F238E27FC236}">
+                <a16:creationId xmlns:a16="http://schemas.microsoft.com/office/drawing/2014/main" id="{9ADC22F9-8384-5741-9F83-4D5A5670262B}"/>
+              </a:ext>
+            </a:extLst>
+          </p:cNvPr>
+          <p:cNvSpPr txBox="1"/>
+          <p:nvPr/>
+        </p:nvSpPr>
+        <p:spPr>
+          <a:xfrm>
+            <a:off x="5213730" y="25527000"/>
+            <a:ext cx="2079658" cy="2677656"/>
+          </a:xfrm>
+          <a:prstGeom prst="rect">
+            <a:avLst/>
+          </a:prstGeom>
+          <a:noFill/>
+        </p:spPr>
+        <p:txBody>
+          <a:bodyPr wrap="square" rtlCol="0">
+            <a:spAutoFit/>
+          </a:bodyPr>
+          <a:lstStyle/>
+          <a:p>
+            <a:r>
               <a:rPr lang="zh-Hant" altLang="en-US" dirty="0"/>
               <a:t>⟵</a:t>
             </a:r>
             <a:r>
               <a:rPr lang="en-US" altLang="zh-Hant" dirty="0"/>
-              <a:t> The relationship between distributed systems.</a:t>
-            </a:r>
-          </a:p>
-          <a:p>
+              <a:t> </a:t>
+            </a:r>
+            <a:r>
+              <a:rPr lang="en-US" altLang="zh-Hant" dirty="0" err="1"/>
+              <a:t>iPerf</a:t>
+            </a:r>
+            <a:r>
+              <a:rPr lang="en-US" altLang="zh-Hant" dirty="0"/>
+              <a:t> Benchmarking result:</a:t>
+            </a:r>
+          </a:p>
+          <a:p>
+            <a:r>
+              <a:rPr lang="en-US" altLang="zh-Hant" dirty="0"/>
+              <a:t>Top: Not in Virtual Time (VT ) </a:t>
+            </a:r>
+          </a:p>
+          <a:p>
+            <a:r>
+              <a:rPr lang="en-US" altLang="zh-Hant" dirty="0"/>
+              <a:t>Bottom: In VT</a:t>
+            </a:r>
             <a:endParaRPr lang="en-US" dirty="0"/>
           </a:p>
-          <a:p>
-            <a:r>
-              <a:rPr lang="en-US" dirty="0"/>
-              <a:t>Each node has 2 major layers: VT Manager, Virtual Time kernel.</a:t>
-            </a:r>
-          </a:p>
-          <a:p>
-            <a:endParaRPr lang="en-US" dirty="0"/>
-          </a:p>
-          <a:p>
-            <a:r>
-              <a:rPr lang="en-US" dirty="0"/>
-              <a:t>They are all connected using </a:t>
-            </a:r>
-            <a:r>
-              <a:rPr lang="en-US" altLang="zh-Hant" dirty="0"/>
-              <a:t>Ethernet, wireless networking, and direct hardware connection.</a:t>
-            </a:r>
-            <a:endParaRPr lang="en-US" dirty="0"/>
-          </a:p>
         </p:txBody>
       </p:sp>
+      <p:pic>
+        <p:nvPicPr>
+          <p:cNvPr id="6" name="Picture 5">
+            <a:extLst>
+              <a:ext uri="{FF2B5EF4-FFF2-40B4-BE49-F238E27FC236}">
+                <a16:creationId xmlns:a16="http://schemas.microsoft.com/office/drawing/2014/main" id="{E71D4D3B-A350-3344-9A88-38DCF12A47A7}"/>
+              </a:ext>
+            </a:extLst>
+          </p:cNvPr>
+          <p:cNvPicPr>
+            <a:picLocks noChangeAspect="1"/>
+          </p:cNvPicPr>
+          <p:nvPr/>
+        </p:nvPicPr>
+        <p:blipFill>
+          <a:blip r:embed="rId13"/>
+          <a:stretch>
+            <a:fillRect/>
+          </a:stretch>
+        </p:blipFill>
+        <p:spPr>
+          <a:xfrm>
+            <a:off x="1406273" y="16454893"/>
+            <a:ext cx="5149961" cy="3433307"/>
+          </a:xfrm>
+          <a:prstGeom prst="rect">
+            <a:avLst/>
+          </a:prstGeom>
+        </p:spPr>
+      </p:pic>
     </p:spTree>
   </p:cSld>
   <p:clrMapOvr>

</xml_diff>